<commit_message>
end of sem changes
</commit_message>
<xml_diff>
--- a/programming starter/prs/programming starter.pptx
+++ b/programming starter/prs/programming starter.pptx
@@ -1113,7 +1113,7 @@
           <a:p>
             <a:fld id="{91EFC4A3-7BF0-4E93-A645-24685B17FB36}" type="datetime4">
               <a:rPr lang="de-DE" noProof="0" smtClean="0"/>
-              <a:t>5. Juli 2024</a:t>
+              <a:t>10. Juli 2024</a:t>
             </a:fld>
             <a:endParaRPr lang="de-DE" noProof="0" dirty="0"/>
           </a:p>
@@ -1698,7 +1698,7 @@
           <a:p>
             <a:fld id="{70838696-0180-4445-B677-64860308D032}" type="datetime4">
               <a:rPr lang="de-DE" noProof="0" smtClean="0"/>
-              <a:t>5. Juli 2024</a:t>
+              <a:t>10. Juli 2024</a:t>
             </a:fld>
             <a:endParaRPr lang="de-DE" noProof="0" dirty="0"/>
           </a:p>
@@ -2173,7 +2173,7 @@
           <a:p>
             <a:fld id="{13BBD197-B443-4094-947A-7E775B79C310}" type="datetime4">
               <a:rPr lang="de-DE" noProof="0" smtClean="0"/>
-              <a:t>5. Juli 2024</a:t>
+              <a:t>10. Juli 2024</a:t>
             </a:fld>
             <a:endParaRPr lang="de-DE" noProof="0" dirty="0"/>
           </a:p>
@@ -2900,7 +2900,7 @@
           <a:p>
             <a:fld id="{B848F595-3A53-4465-A9D4-7161448B6804}" type="datetime4">
               <a:rPr lang="de-DE" noProof="0" smtClean="0"/>
-              <a:t>5. Juli 2024</a:t>
+              <a:t>10. Juli 2024</a:t>
             </a:fld>
             <a:endParaRPr lang="de-DE" noProof="0" dirty="0"/>
           </a:p>
@@ -3523,7 +3523,7 @@
           <a:p>
             <a:fld id="{396EA9BF-EB8A-4913-8C74-5DF64DAF5843}" type="datetime4">
               <a:rPr lang="de-DE" noProof="0" smtClean="0"/>
-              <a:t>5. Juli 2024</a:t>
+              <a:t>10. Juli 2024</a:t>
             </a:fld>
             <a:endParaRPr lang="de-DE" noProof="0" dirty="0"/>
           </a:p>
@@ -3990,7 +3990,7 @@
           <a:p>
             <a:fld id="{AF28F8B0-0C1E-411F-AA6B-DC5D3064A0D5}" type="datetime4">
               <a:rPr lang="de-DE" noProof="0" smtClean="0"/>
-              <a:t>5. Juli 2024</a:t>
+              <a:t>10. Juli 2024</a:t>
             </a:fld>
             <a:endParaRPr lang="de-DE" noProof="0" dirty="0"/>
           </a:p>
@@ -4800,7 +4800,7 @@
           <a:p>
             <a:fld id="{504CB600-3A52-4CAD-B492-09A49197D7A2}" type="datetime4">
               <a:rPr lang="de-DE" noProof="0" smtClean="0"/>
-              <a:t>5. Juli 2024</a:t>
+              <a:t>10. Juli 2024</a:t>
             </a:fld>
             <a:endParaRPr lang="de-DE" noProof="0" dirty="0"/>
           </a:p>
@@ -5310,7 +5310,7 @@
           <a:p>
             <a:fld id="{1D724A35-4CC3-45A1-955B-E9A1310F8EB8}" type="datetime4">
               <a:rPr lang="de-DE" noProof="0" smtClean="0"/>
-              <a:t>5. Juli 2024</a:t>
+              <a:t>10. Juli 2024</a:t>
             </a:fld>
             <a:endParaRPr lang="de-DE" noProof="0" dirty="0"/>
           </a:p>
@@ -5773,7 +5773,7 @@
           <a:p>
             <a:fld id="{81920AAC-57FF-4A30-824C-41AEEB711D05}" type="datetime4">
               <a:rPr lang="de-DE" noProof="0" smtClean="0"/>
-              <a:t>5. Juli 2024</a:t>
+              <a:t>10. Juli 2024</a:t>
             </a:fld>
             <a:endParaRPr lang="de-DE" noProof="0" dirty="0"/>
           </a:p>
@@ -6091,7 +6091,7 @@
           <a:p>
             <a:fld id="{7A221482-CDA6-4B1D-B609-09B1C41DA36C}" type="datetime4">
               <a:rPr lang="de-DE" noProof="0" smtClean="0"/>
-              <a:t>5. Juli 2024</a:t>
+              <a:t>10. Juli 2024</a:t>
             </a:fld>
             <a:endParaRPr lang="de-DE" noProof="0" dirty="0"/>
           </a:p>
@@ -7341,7 +7341,7 @@
           <a:p>
             <a:fld id="{5CF3297A-7534-4AF1-87D7-ED24EC8104A4}" type="datetime4">
               <a:rPr lang="de-DE" noProof="0" smtClean="0"/>
-              <a:t>5. Juli 2024</a:t>
+              <a:t>10. Juli 2024</a:t>
             </a:fld>
             <a:endParaRPr lang="de-DE" noProof="0" dirty="0"/>
           </a:p>
@@ -8556,7 +8556,7 @@
           <a:p>
             <a:fld id="{64B6D16D-8173-46EE-B2CD-4CEFA0A4033B}" type="datetime4">
               <a:rPr lang="de-DE" noProof="0" smtClean="0"/>
-              <a:t>5. Juli 2024</a:t>
+              <a:t>10. Juli 2024</a:t>
             </a:fld>
             <a:endParaRPr lang="de-DE" noProof="0" dirty="0"/>
           </a:p>
@@ -9485,7 +9485,7 @@
           <a:p>
             <a:fld id="{1D3A4E6D-FD2E-442E-83FC-7573EFCD2903}" type="datetime4">
               <a:rPr lang="de-DE" noProof="0" smtClean="0"/>
-              <a:t>5. Juli 2024</a:t>
+              <a:t>10. Juli 2024</a:t>
             </a:fld>
             <a:endParaRPr lang="de-DE" noProof="0" dirty="0"/>
           </a:p>
@@ -10102,7 +10102,7 @@
           <a:p>
             <a:fld id="{458A9826-622D-4690-8A67-E655201CBA64}" type="datetime4">
               <a:rPr lang="de-DE" noProof="0" smtClean="0"/>
-              <a:t>5. Juli 2024</a:t>
+              <a:t>10. Juli 2024</a:t>
             </a:fld>
             <a:endParaRPr lang="de-DE" noProof="0" dirty="0"/>
           </a:p>
@@ -10800,7 +10800,7 @@
           <a:p>
             <a:fld id="{4E2361B9-B017-499A-9311-458153475966}" type="datetime4">
               <a:rPr lang="de-DE" noProof="0" smtClean="0"/>
-              <a:t>5. Juli 2024</a:t>
+              <a:t>10. Juli 2024</a:t>
             </a:fld>
             <a:endParaRPr lang="de-DE" noProof="0" dirty="0"/>
           </a:p>
@@ -11461,7 +11461,7 @@
           <a:p>
             <a:fld id="{4E2361B9-B017-499A-9311-458153475966}" type="datetime4">
               <a:rPr lang="de-DE" noProof="0" smtClean="0"/>
-              <a:t>5. Juli 2024</a:t>
+              <a:t>10. Juli 2024</a:t>
             </a:fld>
             <a:endParaRPr lang="de-DE" noProof="0" dirty="0"/>
           </a:p>
@@ -13593,7 +13593,7 @@
           <a:p>
             <a:fld id="{17861A4D-26DF-4B4D-A8C0-9967DC465046}" type="datetime4">
               <a:rPr lang="de-DE" noProof="0" smtClean="0"/>
-              <a:t>5. Juli 2024</a:t>
+              <a:t>10. Juli 2024</a:t>
             </a:fld>
             <a:endParaRPr lang="de-DE" noProof="0" dirty="0"/>
           </a:p>
@@ -14658,7 +14658,7 @@
           <a:p>
             <a:fld id="{8F1A127F-F424-45E2-A676-1A010C35CFDA}" type="datetime4">
               <a:rPr lang="de-DE" noProof="0" smtClean="0"/>
-              <a:t>5. Juli 2024</a:t>
+              <a:t>10. Juli 2024</a:t>
             </a:fld>
             <a:endParaRPr lang="de-DE" noProof="0" dirty="0"/>
           </a:p>
@@ -16291,7 +16291,7 @@
           <a:p>
             <a:fld id="{AA8A9A55-2ABC-4FFE-87E5-39C6B5EC27C8}" type="datetime4">
               <a:rPr lang="de-DE" noProof="0" smtClean="0"/>
-              <a:t>5. Juli 2024</a:t>
+              <a:t>10. Juli 2024</a:t>
             </a:fld>
             <a:endParaRPr lang="de-DE" noProof="0" dirty="0"/>
           </a:p>
@@ -16546,7 +16546,7 @@
           <a:p>
             <a:fld id="{389EA301-FA80-4CD7-855B-3806D9580403}" type="datetime4">
               <a:rPr lang="de-DE" noProof="0" smtClean="0"/>
-              <a:t>5. Juli 2024</a:t>
+              <a:t>10. Juli 2024</a:t>
             </a:fld>
             <a:endParaRPr lang="de-DE" noProof="0" dirty="0"/>
           </a:p>
@@ -16911,7 +16911,7 @@
           <a:p>
             <a:fld id="{5056D663-3CE6-4D35-8414-429F5E696139}" type="datetime4">
               <a:rPr lang="de-DE" noProof="0" smtClean="0"/>
-              <a:t>5. Juli 2024</a:t>
+              <a:t>10. Juli 2024</a:t>
             </a:fld>
             <a:endParaRPr lang="de-DE" noProof="0" dirty="0"/>
           </a:p>
@@ -17386,7 +17386,7 @@
           <a:p>
             <a:fld id="{C0057E71-A46D-4EB4-AA04-9E0B1DE73B56}" type="datetime4">
               <a:rPr lang="de-DE" noProof="0" smtClean="0"/>
-              <a:t>5. Juli 2024</a:t>
+              <a:t>10. Juli 2024</a:t>
             </a:fld>
             <a:endParaRPr lang="de-DE" noProof="0" dirty="0"/>
           </a:p>
@@ -17907,7 +17907,7 @@
             <a:fld id="{7E413074-A06C-48D2-82BF-B884AE79882A}" type="datetime4">
               <a:rPr lang="de-DE" smtClean="0"/>
               <a:pPr/>
-              <a:t>5. Juli 2024</a:t>
+              <a:t>10. Juli 2024</a:t>
             </a:fld>
             <a:endParaRPr lang="de-DE" dirty="0"/>
           </a:p>
@@ -18961,7 +18961,7 @@
           <a:p>
             <a:fld id="{70838696-0180-4445-B677-64860308D032}" type="datetime4">
               <a:rPr lang="de-DE" noProof="0" smtClean="0"/>
-              <a:t>5. Juli 2024</a:t>
+              <a:t>10. Juli 2024</a:t>
             </a:fld>
             <a:endParaRPr lang="de-DE" noProof="0" dirty="0"/>
           </a:p>
@@ -19425,7 +19425,7 @@
           <a:p>
             <a:fld id="{70838696-0180-4445-B677-64860308D032}" type="datetime4">
               <a:rPr lang="de-DE" noProof="0" smtClean="0"/>
-              <a:t>5. Juli 2024</a:t>
+              <a:t>10. Juli 2024</a:t>
             </a:fld>
             <a:endParaRPr lang="de-DE" noProof="0" dirty="0"/>
           </a:p>
@@ -19565,28 +19565,7 @@
                 <a:latin typeface="Times New Roman" panose="02020603050405020304" pitchFamily="18" charset="0"/>
                 <a:cs typeface="Times New Roman" panose="02020603050405020304" pitchFamily="18" charset="0"/>
               </a:rPr>
-              <a:t>Replaced missing data with custom </a:t>
-            </a:r>
-            <a:r>
-              <a:rPr lang="en-US" dirty="0" err="1">
-                <a:latin typeface="Times New Roman" panose="02020603050405020304" pitchFamily="18" charset="0"/>
-                <a:cs typeface="Times New Roman" panose="02020603050405020304" pitchFamily="18" charset="0"/>
-              </a:rPr>
-              <a:t>values</a:t>
-            </a:r>
-            <a:r>
-              <a:rPr lang="en-US" b="0" dirty="0" err="1">
-                <a:solidFill>
-                  <a:srgbClr val="3B3B3B"/>
-                </a:solidFill>
-                <a:effectLst/>
-                <a:highlight>
-                  <a:srgbClr val="FFFFFF"/>
-                </a:highlight>
-                <a:latin typeface="Times New Roman" panose="02020603050405020304" pitchFamily="18" charset="0"/>
-                <a:cs typeface="Times New Roman" panose="02020603050405020304" pitchFamily="18" charset="0"/>
-              </a:rPr>
-              <a:t>Data</a:t>
+              <a:t>Replaced missing data with custom values </a:t>
             </a:r>
             <a:r>
               <a:rPr lang="en-US" b="0" dirty="0">
@@ -19600,7 +19579,7 @@
                 <a:latin typeface="Times New Roman" panose="02020603050405020304" pitchFamily="18" charset="0"/>
                 <a:cs typeface="Times New Roman" panose="02020603050405020304" pitchFamily="18" charset="0"/>
               </a:rPr>
-              <a:t> used for free agents</a:t>
+              <a:t>Data used for free agents</a:t>
             </a:r>
             <a:r>
               <a:rPr lang="en-US" dirty="0">
@@ -19883,7 +19862,7 @@
           <a:p>
             <a:fld id="{70838696-0180-4445-B677-64860308D032}" type="datetime4">
               <a:rPr lang="de-DE" noProof="0" smtClean="0"/>
-              <a:t>5. Juli 2024</a:t>
+              <a:t>10. Juli 2024</a:t>
             </a:fld>
             <a:endParaRPr lang="de-DE" noProof="0" dirty="0"/>
           </a:p>
@@ -20198,7 +20177,7 @@
           <a:p>
             <a:fld id="{70838696-0180-4445-B677-64860308D032}" type="datetime4">
               <a:rPr lang="de-DE" noProof="0" smtClean="0"/>
-              <a:t>5. Juli 2024</a:t>
+              <a:t>10. Juli 2024</a:t>
             </a:fld>
             <a:endParaRPr lang="de-DE" noProof="0" dirty="0"/>
           </a:p>
@@ -20298,8 +20277,19 @@
                 <a:latin typeface="Times New Roman" panose="02020603050405020304" pitchFamily="18" charset="0"/>
                 <a:cs typeface="Times New Roman" panose="02020603050405020304" pitchFamily="18" charset="0"/>
               </a:rPr>
-              <a:t> Used mean values for new players.</a:t>
-            </a:r>
+              <a:t> Used mean values </a:t>
+            </a:r>
+            <a:r>
+              <a:rPr lang="en-US">
+                <a:latin typeface="Times New Roman" panose="02020603050405020304" pitchFamily="18" charset="0"/>
+                <a:cs typeface="Times New Roman" panose="02020603050405020304" pitchFamily="18" charset="0"/>
+              </a:rPr>
+              <a:t>for missing skills.</a:t>
+            </a:r>
+            <a:endParaRPr lang="en-US" dirty="0">
+              <a:latin typeface="Times New Roman" panose="02020603050405020304" pitchFamily="18" charset="0"/>
+              <a:cs typeface="Times New Roman" panose="02020603050405020304" pitchFamily="18" charset="0"/>
+            </a:endParaRPr>
           </a:p>
         </p:txBody>
       </p:sp>
@@ -20472,7 +20462,7 @@
           <a:p>
             <a:fld id="{70838696-0180-4445-B677-64860308D032}" type="datetime4">
               <a:rPr lang="de-DE" noProof="0" smtClean="0"/>
-              <a:t>5. Juli 2024</a:t>
+              <a:t>10. Juli 2024</a:t>
             </a:fld>
             <a:endParaRPr lang="de-DE" noProof="0" dirty="0"/>
           </a:p>
@@ -20728,7 +20718,7 @@
           <a:p>
             <a:fld id="{AA8A9A55-2ABC-4FFE-87E5-39C6B5EC27C8}" type="datetime4">
               <a:rPr lang="de-DE" noProof="0" smtClean="0"/>
-              <a:t>5. Juli 2024</a:t>
+              <a:t>10. Juli 2024</a:t>
             </a:fld>
             <a:endParaRPr lang="de-DE" noProof="0" dirty="0"/>
           </a:p>
@@ -21408,7 +21398,7 @@
           <a:p>
             <a:fld id="{389EA301-FA80-4CD7-855B-3806D9580403}" type="datetime4">
               <a:rPr lang="de-DE" noProof="0" smtClean="0"/>
-              <a:t>5. Juli 2024</a:t>
+              <a:t>10. Juli 2024</a:t>
             </a:fld>
             <a:endParaRPr lang="de-DE" noProof="0" dirty="0"/>
           </a:p>
@@ -21831,7 +21821,7 @@
           <a:p>
             <a:fld id="{389EA301-FA80-4CD7-855B-3806D9580403}" type="datetime4">
               <a:rPr lang="de-DE" noProof="0" smtClean="0"/>
-              <a:t>5. Juli 2024</a:t>
+              <a:t>10. Juli 2024</a:t>
             </a:fld>
             <a:endParaRPr lang="de-DE" noProof="0" dirty="0"/>
           </a:p>
@@ -22110,7 +22100,7 @@
           <a:p>
             <a:fld id="{389EA301-FA80-4CD7-855B-3806D9580403}" type="datetime4">
               <a:rPr lang="de-DE" noProof="0" smtClean="0"/>
-              <a:t>5. Juli 2024</a:t>
+              <a:t>10. Juli 2024</a:t>
             </a:fld>
             <a:endParaRPr lang="de-DE" noProof="0" dirty="0"/>
           </a:p>
@@ -22577,7 +22567,7 @@
           <a:p>
             <a:fld id="{389EA301-FA80-4CD7-855B-3806D9580403}" type="datetime4">
               <a:rPr lang="de-DE" noProof="0" smtClean="0"/>
-              <a:t>5. Juli 2024</a:t>
+              <a:t>10. Juli 2024</a:t>
             </a:fld>
             <a:endParaRPr lang="de-DE" noProof="0" dirty="0"/>
           </a:p>
@@ -23295,7 +23285,7 @@
           <a:p>
             <a:fld id="{389EA301-FA80-4CD7-855B-3806D9580403}" type="datetime4">
               <a:rPr lang="de-DE" noProof="0" smtClean="0"/>
-              <a:t>5. Juli 2024</a:t>
+              <a:t>10. Juli 2024</a:t>
             </a:fld>
             <a:endParaRPr lang="de-DE" noProof="0" dirty="0"/>
           </a:p>
@@ -23614,7 +23604,7 @@
           <a:p>
             <a:fld id="{389EA301-FA80-4CD7-855B-3806D9580403}" type="datetime4">
               <a:rPr lang="de-DE" noProof="0" smtClean="0"/>
-              <a:t>5. Juli 2024</a:t>
+              <a:t>10. Juli 2024</a:t>
             </a:fld>
             <a:endParaRPr lang="de-DE" noProof="0" dirty="0"/>
           </a:p>
@@ -23898,7 +23888,7 @@
           <a:p>
             <a:fld id="{389EA301-FA80-4CD7-855B-3806D9580403}" type="datetime4">
               <a:rPr lang="de-DE" noProof="0" smtClean="0"/>
-              <a:t>5. Juli 2024</a:t>
+              <a:t>10. Juli 2024</a:t>
             </a:fld>
             <a:endParaRPr lang="de-DE" noProof="0" dirty="0"/>
           </a:p>
@@ -24136,7 +24126,7 @@
           <a:p>
             <a:fld id="{389EA301-FA80-4CD7-855B-3806D9580403}" type="datetime4">
               <a:rPr lang="de-DE" noProof="0" smtClean="0"/>
-              <a:t>5. Juli 2024</a:t>
+              <a:t>10. Juli 2024</a:t>
             </a:fld>
             <a:endParaRPr lang="de-DE" noProof="0" dirty="0"/>
           </a:p>
@@ -24403,7 +24393,7 @@
           <a:p>
             <a:fld id="{389EA301-FA80-4CD7-855B-3806D9580403}" type="datetime4">
               <a:rPr lang="de-DE" noProof="0" smtClean="0"/>
-              <a:t>5. Juli 2024</a:t>
+              <a:t>10. Juli 2024</a:t>
             </a:fld>
             <a:endParaRPr lang="de-DE" noProof="0" dirty="0"/>
           </a:p>
@@ -24641,7 +24631,7 @@
           <a:p>
             <a:fld id="{389EA301-FA80-4CD7-855B-3806D9580403}" type="datetime4">
               <a:rPr lang="de-DE" noProof="0" smtClean="0"/>
-              <a:t>5. Juli 2024</a:t>
+              <a:t>10. Juli 2024</a:t>
             </a:fld>
             <a:endParaRPr lang="de-DE" noProof="0" dirty="0"/>
           </a:p>
@@ -24883,7 +24873,7 @@
           <a:p>
             <a:fld id="{389EA301-FA80-4CD7-855B-3806D9580403}" type="datetime4">
               <a:rPr lang="de-DE" noProof="0" smtClean="0"/>
-              <a:t>5. Juli 2024</a:t>
+              <a:t>10. Juli 2024</a:t>
             </a:fld>
             <a:endParaRPr lang="de-DE" noProof="0" dirty="0"/>
           </a:p>
@@ -25312,7 +25302,7 @@
           <a:p>
             <a:fld id="{389EA301-FA80-4CD7-855B-3806D9580403}" type="datetime4">
               <a:rPr lang="de-DE" noProof="0" smtClean="0"/>
-              <a:t>5. Juli 2024</a:t>
+              <a:t>10. Juli 2024</a:t>
             </a:fld>
             <a:endParaRPr lang="de-DE" noProof="0" dirty="0"/>
           </a:p>
@@ -25826,7 +25816,7 @@
           <a:p>
             <a:fld id="{5056D663-3CE6-4D35-8414-429F5E696139}" type="datetime4">
               <a:rPr lang="de-DE" noProof="0" smtClean="0"/>
-              <a:t>5. Juli 2024</a:t>
+              <a:t>10. Juli 2024</a:t>
             </a:fld>
             <a:endParaRPr lang="de-DE" noProof="0" dirty="0"/>
           </a:p>
@@ -26080,7 +26070,7 @@
           <a:p>
             <a:fld id="{389EA301-FA80-4CD7-855B-3806D9580403}" type="datetime4">
               <a:rPr lang="de-DE" noProof="0" smtClean="0"/>
-              <a:t>5. Juli 2024</a:t>
+              <a:t>10. Juli 2024</a:t>
             </a:fld>
             <a:endParaRPr lang="de-DE" noProof="0" dirty="0"/>
           </a:p>
@@ -26325,7 +26315,7 @@
           <a:p>
             <a:fld id="{17861A4D-26DF-4B4D-A8C0-9967DC465046}" type="datetime4">
               <a:rPr lang="de-DE" noProof="0" smtClean="0"/>
-              <a:t>5. Juli 2024</a:t>
+              <a:t>10. Juli 2024</a:t>
             </a:fld>
             <a:endParaRPr lang="de-DE" noProof="0" dirty="0"/>
           </a:p>
@@ -26719,7 +26709,7 @@
           <a:p>
             <a:fld id="{389EA301-FA80-4CD7-855B-3806D9580403}" type="datetime4">
               <a:rPr lang="de-DE" noProof="0" smtClean="0"/>
-              <a:t>5. Juli 2024</a:t>
+              <a:t>10. Juli 2024</a:t>
             </a:fld>
             <a:endParaRPr lang="de-DE" noProof="0" dirty="0"/>
           </a:p>
@@ -27028,7 +27018,7 @@
           <a:p>
             <a:r>
               <a:rPr lang="en-GB" dirty="0"/>
-              <a:t>l) Number of teams vs nationality</a:t>
+              <a:t>i) Number of teams vs nationality</a:t>
             </a:r>
             <a:endParaRPr lang="LID4096" dirty="0"/>
           </a:p>
@@ -27057,7 +27047,7 @@
           <a:p>
             <a:fld id="{389EA301-FA80-4CD7-855B-3806D9580403}" type="datetime4">
               <a:rPr lang="de-DE" noProof="0" smtClean="0"/>
-              <a:t>5. Juli 2024</a:t>
+              <a:t>10. Juli 2024</a:t>
             </a:fld>
             <a:endParaRPr lang="de-DE" noProof="0" dirty="0"/>
           </a:p>
@@ -27241,7 +27231,7 @@
           <a:p>
             <a:r>
               <a:rPr lang="en-GB" dirty="0"/>
-              <a:t>b) Number of coaches vs nationality</a:t>
+              <a:t>ii) Number of coaches vs nationality</a:t>
             </a:r>
             <a:endParaRPr lang="LID4096" dirty="0"/>
           </a:p>
@@ -27270,7 +27260,7 @@
           <a:p>
             <a:fld id="{389EA301-FA80-4CD7-855B-3806D9580403}" type="datetime4">
               <a:rPr lang="de-DE" noProof="0" smtClean="0"/>
-              <a:t>5. Juli 2024</a:t>
+              <a:t>10. Juli 2024</a:t>
             </a:fld>
             <a:endParaRPr lang="de-DE" noProof="0" dirty="0"/>
           </a:p>
@@ -27479,7 +27469,7 @@
           <a:p>
             <a:r>
               <a:rPr lang="en-GB" dirty="0"/>
-              <a:t>c) </a:t>
+              <a:t>iii) </a:t>
             </a:r>
             <a:endParaRPr lang="LID4096" dirty="0"/>
           </a:p>
@@ -27508,7 +27498,7 @@
           <a:p>
             <a:fld id="{389EA301-FA80-4CD7-855B-3806D9580403}" type="datetime4">
               <a:rPr lang="de-DE" noProof="0" smtClean="0"/>
-              <a:t>5. Juli 2024</a:t>
+              <a:t>10. Juli 2024</a:t>
             </a:fld>
             <a:endParaRPr lang="de-DE" noProof="0" dirty="0"/>
           </a:p>
@@ -27750,7 +27740,7 @@
           <a:p>
             <a:fld id="{389EA301-FA80-4CD7-855B-3806D9580403}" type="datetime4">
               <a:rPr lang="de-DE" noProof="0" smtClean="0"/>
-              <a:t>5. Juli 2024</a:t>
+              <a:t>10. Juli 2024</a:t>
             </a:fld>
             <a:endParaRPr lang="de-DE" noProof="0" dirty="0"/>
           </a:p>
@@ -27992,7 +27982,7 @@
           <a:p>
             <a:fld id="{389EA301-FA80-4CD7-855B-3806D9580403}" type="datetime4">
               <a:rPr lang="de-DE" noProof="0" smtClean="0"/>
-              <a:t>5. Juli 2024</a:t>
+              <a:t>10. Juli 2024</a:t>
             </a:fld>
             <a:endParaRPr lang="de-DE" noProof="0" dirty="0"/>
           </a:p>
@@ -28234,7 +28224,7 @@
           <a:p>
             <a:fld id="{389EA301-FA80-4CD7-855B-3806D9580403}" type="datetime4">
               <a:rPr lang="de-DE" noProof="0" smtClean="0"/>
-              <a:t>5. Juli 2024</a:t>
+              <a:t>10. Juli 2024</a:t>
             </a:fld>
             <a:endParaRPr lang="de-DE" noProof="0" dirty="0"/>
           </a:p>
@@ -28857,7 +28847,7 @@
           <a:p>
             <a:fld id="{5056D663-3CE6-4D35-8414-429F5E696139}" type="datetime4">
               <a:rPr lang="de-DE" noProof="0" smtClean="0"/>
-              <a:t>5. Juli 2024</a:t>
+              <a:t>10. Juli 2024</a:t>
             </a:fld>
             <a:endParaRPr lang="de-DE" noProof="0" dirty="0"/>
           </a:p>
@@ -29022,31 +29012,6 @@
               <a:latin typeface="Times New Roman" panose="02020603050405020304" pitchFamily="18" charset="0"/>
               <a:cs typeface="Times New Roman" panose="02020603050405020304" pitchFamily="18" charset="0"/>
             </a:endParaRPr>
-          </a:p>
-        </p:txBody>
-      </p:sp>
-      <p:sp>
-        <p:nvSpPr>
-          <p:cNvPr id="7" name="Content Placeholder 6">
-            <a:extLst>
-              <a:ext uri="{FF2B5EF4-FFF2-40B4-BE49-F238E27FC236}">
-                <a16:creationId xmlns:a16="http://schemas.microsoft.com/office/drawing/2014/main" id="{E986E412-CA14-75B0-C9C8-958C6D782990}"/>
-              </a:ext>
-            </a:extLst>
-          </p:cNvPr>
-          <p:cNvSpPr>
-            <a:spLocks noGrp="1"/>
-          </p:cNvSpPr>
-          <p:nvPr>
-            <p:ph sz="quarter" idx="18"/>
-          </p:nvPr>
-        </p:nvSpPr>
-        <p:spPr/>
-        <p:txBody>
-          <a:bodyPr/>
-          <a:lstStyle/>
-          <a:p>
-            <a:endParaRPr lang="LID4096" dirty="0"/>
           </a:p>
         </p:txBody>
       </p:sp>
@@ -29214,7 +29179,7 @@
           <a:p>
             <a:fld id="{70838696-0180-4445-B677-64860308D032}" type="datetime4">
               <a:rPr lang="de-DE" noProof="0" smtClean="0"/>
-              <a:t>5. Juli 2024</a:t>
+              <a:t>10. Juli 2024</a:t>
             </a:fld>
             <a:endParaRPr lang="de-DE" noProof="0" dirty="0"/>
           </a:p>
@@ -29770,7 +29735,7 @@
           <a:p>
             <a:fld id="{70838696-0180-4445-B677-64860308D032}" type="datetime4">
               <a:rPr lang="de-DE" noProof="0" smtClean="0"/>
-              <a:t>5. Juli 2024</a:t>
+              <a:t>10. Juli 2024</a:t>
             </a:fld>
             <a:endParaRPr lang="de-DE" noProof="0" dirty="0"/>
           </a:p>
@@ -30130,7 +30095,7 @@
           <a:p>
             <a:fld id="{70838696-0180-4445-B677-64860308D032}" type="datetime4">
               <a:rPr lang="de-DE" noProof="0" smtClean="0"/>
-              <a:t>5. Juli 2024</a:t>
+              <a:t>10. Juli 2024</a:t>
             </a:fld>
             <a:endParaRPr lang="de-DE" noProof="0" dirty="0"/>
           </a:p>
@@ -30461,7 +30426,7 @@
           <a:p>
             <a:fld id="{70838696-0180-4445-B677-64860308D032}" type="datetime4">
               <a:rPr lang="de-DE" noProof="0" smtClean="0"/>
-              <a:t>5. Juli 2024</a:t>
+              <a:t>10. Juli 2024</a:t>
             </a:fld>
             <a:endParaRPr lang="de-DE" noProof="0" dirty="0"/>
           </a:p>
@@ -30772,7 +30737,7 @@
           <a:p>
             <a:fld id="{70838696-0180-4445-B677-64860308D032}" type="datetime4">
               <a:rPr lang="de-DE" noProof="0" smtClean="0"/>
-              <a:t>5. Juli 2024</a:t>
+              <a:t>10. Juli 2024</a:t>
             </a:fld>
             <a:endParaRPr lang="de-DE" noProof="0" dirty="0"/>
           </a:p>

</xml_diff>